<commit_message>
view module now updates menu items name, desc, and price
</commit_message>
<xml_diff>
--- a/resources/SpecialsSlide.pptx
+++ b/resources/SpecialsSlide.pptx
@@ -3204,7 +3204,7 @@
         </p:nvSpPr>
         <p:spPr>
           <a:xfrm>
-            <a:off x="3019393" y="1705488"/>
+            <a:off x="3019393" y="1567259"/>
             <a:ext cx="5539563" cy="369332"/>
           </a:xfrm>
           <a:prstGeom prst="rect">
@@ -3219,10 +3219,9 @@
           <a:lstStyle/>
           <a:p>
             <a:r>
-              <a:rPr lang="en-US" dirty="0" smtClean="0"/>
-              <a:t>Name 1</a:t>
-            </a:r>
-            <a:endParaRPr lang="en-US" dirty="0"/>
+              <a:rPr b="1" dirty="0"/>
+              <a:t>Club Sandwich</a:t>
+            </a:r>
           </a:p>
         </p:txBody>
       </p:sp>
@@ -3234,8 +3233,8 @@
         </p:nvSpPr>
         <p:spPr>
           <a:xfrm>
-            <a:off x="3019393" y="2074820"/>
-            <a:ext cx="5539563" cy="369332"/>
+            <a:off x="3019393" y="1915325"/>
+            <a:ext cx="5539563" cy="584775"/>
           </a:xfrm>
           <a:prstGeom prst="rect">
             <a:avLst/>
@@ -3249,10 +3248,16 @@
           <a:lstStyle/>
           <a:p>
             <a:r>
-              <a:rPr lang="en-US" dirty="0" smtClean="0"/>
-              <a:t>Description 1</a:t>
-            </a:r>
-            <a:endParaRPr lang="en-US" dirty="0"/>
+              <a:rPr sz="1600" dirty="0">
+                <a:solidFill>
+                  <a:schemeClr val="tx1">
+                    <a:lumMod val="50000"/>
+                    <a:lumOff val="50000"/>
+                  </a:schemeClr>
+                </a:solidFill>
+              </a:rPr>
+              <a:t>chicken breast, bacon, tomato, lettuce, cheese, avocado &amp; aioli on turkish with chips</a:t>
+            </a:r>
           </a:p>
         </p:txBody>
       </p:sp>
@@ -3264,8 +3269,8 @@
         </p:nvSpPr>
         <p:spPr>
           <a:xfrm>
-            <a:off x="8860212" y="1794093"/>
-            <a:ext cx="1254812" cy="369332"/>
+            <a:off x="8860212" y="1751561"/>
+            <a:ext cx="1123760" cy="369332"/>
           </a:xfrm>
           <a:prstGeom prst="rect">
             <a:avLst/>
@@ -3279,10 +3284,9 @@
           <a:lstStyle/>
           <a:p>
             <a:r>
-              <a:rPr lang="en-US" smtClean="0"/>
-              <a:t>Price 1</a:t>
-            </a:r>
-            <a:endParaRPr lang="en-US" dirty="0"/>
+              <a:rPr b="1" dirty="0"/>
+              <a:t>11.00</a:t>
+            </a:r>
           </a:p>
         </p:txBody>
       </p:sp>
@@ -3294,7 +3298,7 @@
         </p:nvSpPr>
         <p:spPr>
           <a:xfrm>
-            <a:off x="3019393" y="2943621"/>
+            <a:off x="3019393" y="2901089"/>
             <a:ext cx="5539563" cy="369332"/>
           </a:xfrm>
           <a:prstGeom prst="rect">
@@ -3309,10 +3313,9 @@
           <a:lstStyle/>
           <a:p>
             <a:r>
-              <a:rPr lang="en-US" dirty="0" smtClean="0"/>
-              <a:t>Name 2</a:t>
-            </a:r>
-            <a:endParaRPr lang="en-US" dirty="0"/>
+              <a:rPr b="1" dirty="0"/>
+              <a:t>Fish &amp; Chips</a:t>
+            </a:r>
           </a:p>
         </p:txBody>
       </p:sp>
@@ -3324,8 +3327,8 @@
         </p:nvSpPr>
         <p:spPr>
           <a:xfrm>
-            <a:off x="3019393" y="3312953"/>
-            <a:ext cx="5539563" cy="369332"/>
+            <a:off x="3019393" y="3238522"/>
+            <a:ext cx="5539563" cy="338554"/>
           </a:xfrm>
           <a:prstGeom prst="rect">
             <a:avLst/>
@@ -3339,10 +3342,16 @@
           <a:lstStyle/>
           <a:p>
             <a:r>
-              <a:rPr lang="en-US" dirty="0" smtClean="0"/>
-              <a:t>Description 2</a:t>
-            </a:r>
-            <a:endParaRPr lang="en-US" dirty="0"/>
+              <a:rPr sz="1600" dirty="0">
+                <a:solidFill>
+                  <a:schemeClr val="tx1">
+                    <a:lumMod val="50000"/>
+                    <a:lumOff val="50000"/>
+                  </a:schemeClr>
+                </a:solidFill>
+              </a:rPr>
+              <a:t>beer battered fish &amp; chips with salad &amp; tartare sauce</a:t>
+            </a:r>
           </a:p>
         </p:txBody>
       </p:sp>
@@ -3369,10 +3378,9 @@
           <a:lstStyle/>
           <a:p>
             <a:r>
-              <a:rPr lang="en-US" dirty="0" smtClean="0"/>
-              <a:t>Price 2</a:t>
-            </a:r>
-            <a:endParaRPr lang="en-US" dirty="0"/>
+              <a:rPr b="1" dirty="0"/>
+              <a:t>11.00</a:t>
+            </a:r>
           </a:p>
         </p:txBody>
       </p:sp>
@@ -3399,10 +3407,9 @@
           <a:lstStyle/>
           <a:p>
             <a:r>
-              <a:rPr lang="en-US" dirty="0" smtClean="0"/>
-              <a:t>Name 3</a:t>
-            </a:r>
-            <a:endParaRPr lang="en-US" dirty="0"/>
+              <a:rPr b="1" dirty="0"/>
+              <a:t>Jalapeno Fish Tails &amp; Chips</a:t>
+            </a:r>
           </a:p>
         </p:txBody>
       </p:sp>
@@ -3414,8 +3421,8 @@
         </p:nvSpPr>
         <p:spPr>
           <a:xfrm>
-            <a:off x="3019393" y="4464941"/>
-            <a:ext cx="5539563" cy="369332"/>
+            <a:off x="3019393" y="4401143"/>
+            <a:ext cx="5539563" cy="584775"/>
           </a:xfrm>
           <a:prstGeom prst="rect">
             <a:avLst/>
@@ -3429,10 +3436,16 @@
           <a:lstStyle/>
           <a:p>
             <a:r>
-              <a:rPr lang="en-US" dirty="0" smtClean="0"/>
-              <a:t>Description 3</a:t>
-            </a:r>
-            <a:endParaRPr lang="en-US" dirty="0"/>
+              <a:rPr sz="1600" dirty="0">
+                <a:solidFill>
+                  <a:schemeClr val="tx1">
+                    <a:lumMod val="50000"/>
+                    <a:lumOff val="50000"/>
+                  </a:schemeClr>
+                </a:solidFill>
+              </a:rPr>
+              <a:t>crumbed jalapeno fish tails served with chips, salad &amp; tartare sauce</a:t>
+            </a:r>
           </a:p>
         </p:txBody>
       </p:sp>
@@ -3459,10 +3472,9 @@
           <a:lstStyle/>
           <a:p>
             <a:r>
-              <a:rPr lang="en-US" dirty="0" smtClean="0"/>
-              <a:t>Price 3</a:t>
-            </a:r>
-            <a:endParaRPr lang="en-US" dirty="0"/>
+              <a:rPr b="1" dirty="0"/>
+              <a:t>11.00</a:t>
+            </a:r>
           </a:p>
         </p:txBody>
       </p:sp>

</xml_diff>